<commit_message>
change of  3D-CNN result
</commit_message>
<xml_diff>
--- a/submission/results/cs572 results_hjhan.pptx
+++ b/submission/results/cs572 results_hjhan.pptx
@@ -5820,7 +5820,7 @@
           <p:nvPr>
             <p:extLst>
               <p:ext uri="{D42A27DB-BD31-4B8C-83A1-F6EECF244321}">
-                <p14:modId xmlns:p14="http://schemas.microsoft.com/office/powerpoint/2010/main" val="4238671046"/>
+                <p14:modId xmlns:p14="http://schemas.microsoft.com/office/powerpoint/2010/main" val="1286085625"/>
               </p:ext>
             </p:extLst>
           </p:nvPr>
@@ -6809,7 +6809,7 @@
                           <a:ea typeface="+mn-ea"/>
                           <a:cs typeface="+mn-cs"/>
                         </a:rPr>
-                        <a:t>84.44</a:t>
+                        <a:t>87.78</a:t>
                       </a:r>
                       <a:endParaRPr lang="ko-KR" altLang="en-US" sz="1800" kern="1200" dirty="0">
                         <a:solidFill>

</xml_diff>